<commit_message>
Uploaded new version of presentation
</commit_message>
<xml_diff>
--- a/ML/presentation/Mushrooms_presentation_datavirus.pptx
+++ b/ML/presentation/Mushrooms_presentation_datavirus.pptx
@@ -205,7 +205,7 @@
           <a:p>
             <a:fld id="{20EDD7E7-CF05-4DA8-9477-FECF37F22A89}" type="datetimeFigureOut">
               <a:rPr lang="pl-PL" smtClean="0"/>
-              <a:t>26.06.2021</a:t>
+              <a:t>27.06.2021</a:t>
             </a:fld>
             <a:endParaRPr lang="pl-PL"/>
           </a:p>
@@ -619,7 +619,7 @@
           <a:p>
             <a:fld id="{77D541BA-D05B-4EA6-8DC8-D3182A03BB2A}" type="datetimeFigureOut">
               <a:rPr lang="pl-PL" smtClean="0"/>
-              <a:t>26.06.2021</a:t>
+              <a:t>27.06.2021</a:t>
             </a:fld>
             <a:endParaRPr lang="pl-PL"/>
           </a:p>
@@ -817,7 +817,7 @@
           <a:p>
             <a:fld id="{77D541BA-D05B-4EA6-8DC8-D3182A03BB2A}" type="datetimeFigureOut">
               <a:rPr lang="pl-PL" smtClean="0"/>
-              <a:t>26.06.2021</a:t>
+              <a:t>27.06.2021</a:t>
             </a:fld>
             <a:endParaRPr lang="pl-PL"/>
           </a:p>
@@ -1025,7 +1025,7 @@
           <a:p>
             <a:fld id="{77D541BA-D05B-4EA6-8DC8-D3182A03BB2A}" type="datetimeFigureOut">
               <a:rPr lang="pl-PL" smtClean="0"/>
-              <a:t>26.06.2021</a:t>
+              <a:t>27.06.2021</a:t>
             </a:fld>
             <a:endParaRPr lang="pl-PL"/>
           </a:p>
@@ -1223,7 +1223,7 @@
           <a:p>
             <a:fld id="{77D541BA-D05B-4EA6-8DC8-D3182A03BB2A}" type="datetimeFigureOut">
               <a:rPr lang="pl-PL" smtClean="0"/>
-              <a:t>26.06.2021</a:t>
+              <a:t>27.06.2021</a:t>
             </a:fld>
             <a:endParaRPr lang="pl-PL"/>
           </a:p>
@@ -1498,7 +1498,7 @@
           <a:p>
             <a:fld id="{77D541BA-D05B-4EA6-8DC8-D3182A03BB2A}" type="datetimeFigureOut">
               <a:rPr lang="pl-PL" smtClean="0"/>
-              <a:t>26.06.2021</a:t>
+              <a:t>27.06.2021</a:t>
             </a:fld>
             <a:endParaRPr lang="pl-PL"/>
           </a:p>
@@ -1763,7 +1763,7 @@
           <a:p>
             <a:fld id="{77D541BA-D05B-4EA6-8DC8-D3182A03BB2A}" type="datetimeFigureOut">
               <a:rPr lang="pl-PL" smtClean="0"/>
-              <a:t>26.06.2021</a:t>
+              <a:t>27.06.2021</a:t>
             </a:fld>
             <a:endParaRPr lang="pl-PL"/>
           </a:p>
@@ -2175,7 +2175,7 @@
           <a:p>
             <a:fld id="{77D541BA-D05B-4EA6-8DC8-D3182A03BB2A}" type="datetimeFigureOut">
               <a:rPr lang="pl-PL" smtClean="0"/>
-              <a:t>26.06.2021</a:t>
+              <a:t>27.06.2021</a:t>
             </a:fld>
             <a:endParaRPr lang="pl-PL"/>
           </a:p>
@@ -2316,7 +2316,7 @@
           <a:p>
             <a:fld id="{77D541BA-D05B-4EA6-8DC8-D3182A03BB2A}" type="datetimeFigureOut">
               <a:rPr lang="pl-PL" smtClean="0"/>
-              <a:t>26.06.2021</a:t>
+              <a:t>27.06.2021</a:t>
             </a:fld>
             <a:endParaRPr lang="pl-PL"/>
           </a:p>
@@ -2429,7 +2429,7 @@
           <a:p>
             <a:fld id="{77D541BA-D05B-4EA6-8DC8-D3182A03BB2A}" type="datetimeFigureOut">
               <a:rPr lang="pl-PL" smtClean="0"/>
-              <a:t>26.06.2021</a:t>
+              <a:t>27.06.2021</a:t>
             </a:fld>
             <a:endParaRPr lang="pl-PL"/>
           </a:p>
@@ -2740,7 +2740,7 @@
           <a:p>
             <a:fld id="{77D541BA-D05B-4EA6-8DC8-D3182A03BB2A}" type="datetimeFigureOut">
               <a:rPr lang="pl-PL" smtClean="0"/>
-              <a:t>26.06.2021</a:t>
+              <a:t>27.06.2021</a:t>
             </a:fld>
             <a:endParaRPr lang="pl-PL"/>
           </a:p>
@@ -3028,7 +3028,7 @@
           <a:p>
             <a:fld id="{77D541BA-D05B-4EA6-8DC8-D3182A03BB2A}" type="datetimeFigureOut">
               <a:rPr lang="pl-PL" smtClean="0"/>
-              <a:t>26.06.2021</a:t>
+              <a:t>27.06.2021</a:t>
             </a:fld>
             <a:endParaRPr lang="pl-PL"/>
           </a:p>
@@ -3269,7 +3269,7 @@
           <a:p>
             <a:fld id="{77D541BA-D05B-4EA6-8DC8-D3182A03BB2A}" type="datetimeFigureOut">
               <a:rPr lang="pl-PL" smtClean="0"/>
-              <a:t>26.06.2021</a:t>
+              <a:t>27.06.2021</a:t>
             </a:fld>
             <a:endParaRPr lang="pl-PL"/>
           </a:p>
@@ -7116,10 +7116,10 @@
       </p:sp>
       <p:pic>
         <p:nvPicPr>
-          <p:cNvPr id="3" name="Obraz 2">
-            <a:extLst>
-              <a:ext uri="{FF2B5EF4-FFF2-40B4-BE49-F238E27FC236}">
-                <a16:creationId xmlns:a16="http://schemas.microsoft.com/office/drawing/2014/main" id="{CF7F4129-D8DB-4949-9C09-EB498E872EBD}"/>
+          <p:cNvPr id="4" name="Obraz 3">
+            <a:extLst>
+              <a:ext uri="{FF2B5EF4-FFF2-40B4-BE49-F238E27FC236}">
+                <a16:creationId xmlns:a16="http://schemas.microsoft.com/office/drawing/2014/main" id="{BEE071F0-7B70-4E8E-9260-2DF8B8160A8D}"/>
               </a:ext>
             </a:extLst>
           </p:cNvPr>
@@ -7136,8 +7136,8 @@
         </p:blipFill>
         <p:spPr>
           <a:xfrm>
-            <a:off x="2376487" y="3090361"/>
-            <a:ext cx="7439025" cy="3019425"/>
+            <a:off x="1914342" y="3135612"/>
+            <a:ext cx="8363315" cy="3394585"/>
           </a:xfrm>
           <a:prstGeom prst="rect">
             <a:avLst/>

</xml_diff>